<commit_message>
rpi_answer.pptx renamed to RFP_answer.pptx
</commit_message>
<xml_diff>
--- a/Documents/RFP_answer.pptx
+++ b/Documents/RFP_answer.pptx
@@ -114,13 +114,29 @@
       </a:defRPr>
     </a:lvl9pPr>
   </p:defaultTextStyle>
+  <p:extLst>
+    <p:ext uri="{EFAFB233-063F-42B5-8137-9DF3F51BA10A}">
+      <p15:sldGuideLst xmlns:p15="http://schemas.microsoft.com/office/powerpoint/2012/main">
+        <p15:guide id="1" orient="horz" pos="2160">
+          <p15:clr>
+            <a:srgbClr val="A4A3A4"/>
+          </p15:clr>
+        </p15:guide>
+        <p15:guide id="2" pos="3840">
+          <p15:clr>
+            <a:srgbClr val="A4A3A4"/>
+          </p15:clr>
+        </p15:guide>
+      </p15:sldGuideLst>
+    </p:ext>
+  </p:extLst>
 </p:presentation>
 </file>
 
 <file path=ppt/charts/chart1.xml><?xml version="1.0" encoding="utf-8"?>
-<c:chartSpace xmlns:c="http://schemas.openxmlformats.org/drawingml/2006/chart" xmlns:a="http://schemas.openxmlformats.org/drawingml/2006/main" xmlns:r="http://schemas.openxmlformats.org/officeDocument/2006/relationships">
+<c:chartSpace xmlns:c="http://schemas.openxmlformats.org/drawingml/2006/chart" xmlns:a="http://schemas.openxmlformats.org/drawingml/2006/main" xmlns:r="http://schemas.openxmlformats.org/officeDocument/2006/relationships" xmlns:c16r2="http://schemas.microsoft.com/office/drawing/2015/06/chart">
   <c:date1904 val="0"/>
-  <c:lang val="de-DE"/>
+  <c:lang val="en-US"/>
   <c:roundedCorners val="0"/>
   <mc:AlternateContent xmlns:mc="http://schemas.openxmlformats.org/markup-compatibility/2006">
     <mc:Choice xmlns:c14="http://schemas.microsoft.com/office/drawing/2007/8/2/chart" Requires="c14">
@@ -136,7 +152,6 @@
       <c:rotX val="30"/>
       <c:rotY val="0"/>
       <c:rAngAx val="0"/>
-      <c:perspective val="30"/>
     </c:view3D>
     <c:floor>
       <c:thickness val="0"/>
@@ -169,28 +184,33 @@
             <c:idx val="0"/>
             <c:bubble3D val="0"/>
             <c:explosion val="6"/>
+            <c:extLst>
+              <c:ext xmlns:c16="http://schemas.microsoft.com/office/drawing/2014/chart" uri="{C3380CC4-5D6E-409C-BE32-E72D297353CC}">
+                <c16:uniqueId val="{00000000-EB02-4199-875A-2F5AA991C3F8}"/>
+              </c:ext>
+            </c:extLst>
           </c:dPt>
           <c:dPt>
             <c:idx val="1"/>
             <c:bubble3D val="0"/>
             <c:explosion val="7"/>
+            <c:extLst>
+              <c:ext xmlns:c16="http://schemas.microsoft.com/office/drawing/2014/chart" uri="{C3380CC4-5D6E-409C-BE32-E72D297353CC}">
+                <c16:uniqueId val="{00000001-EB02-4199-875A-2F5AA991C3F8}"/>
+              </c:ext>
+            </c:extLst>
           </c:dPt>
           <c:dLbls>
             <c:dLbl>
               <c:idx val="0"/>
-              <c:layout/>
               <c:tx>
                 <c:rich>
                   <a:bodyPr/>
                   <a:lstStyle/>
                   <a:p>
                     <a:r>
-                      <a:rPr lang="en-US" dirty="0" smtClean="0"/>
-                      <a:t>20</a:t>
-                    </a:r>
-                    <a:r>
                       <a:rPr lang="en-US" dirty="0"/>
-                      <a:t>%</a:t>
+                      <a:t>20%</a:t>
                     </a:r>
                   </a:p>
                 </c:rich>
@@ -201,22 +221,23 @@
               <c:showSerName val="0"/>
               <c:showPercent val="1"/>
               <c:showBubbleSize val="0"/>
+              <c:extLst>
+                <c:ext xmlns:c15="http://schemas.microsoft.com/office/drawing/2012/chart" uri="{CE6537A1-D6FC-4f65-9D91-7224C49458BB}"/>
+                <c:ext xmlns:c16="http://schemas.microsoft.com/office/drawing/2014/chart" uri="{C3380CC4-5D6E-409C-BE32-E72D297353CC}">
+                  <c16:uniqueId val="{00000000-EB02-4199-875A-2F5AA991C3F8}"/>
+                </c:ext>
+              </c:extLst>
             </c:dLbl>
             <c:dLbl>
               <c:idx val="1"/>
-              <c:layout/>
               <c:tx>
                 <c:rich>
                   <a:bodyPr/>
                   <a:lstStyle/>
                   <a:p>
                     <a:r>
-                      <a:rPr lang="en-US" dirty="0" smtClean="0"/>
-                      <a:t>15</a:t>
-                    </a:r>
-                    <a:r>
                       <a:rPr lang="en-US" dirty="0"/>
-                      <a:t>%</a:t>
+                      <a:t>15%</a:t>
                     </a:r>
                   </a:p>
                 </c:rich>
@@ -227,22 +248,23 @@
               <c:showSerName val="0"/>
               <c:showPercent val="1"/>
               <c:showBubbleSize val="0"/>
+              <c:extLst>
+                <c:ext xmlns:c15="http://schemas.microsoft.com/office/drawing/2012/chart" uri="{CE6537A1-D6FC-4f65-9D91-7224C49458BB}"/>
+                <c:ext xmlns:c16="http://schemas.microsoft.com/office/drawing/2014/chart" uri="{C3380CC4-5D6E-409C-BE32-E72D297353CC}">
+                  <c16:uniqueId val="{00000001-EB02-4199-875A-2F5AA991C3F8}"/>
+                </c:ext>
+              </c:extLst>
             </c:dLbl>
             <c:dLbl>
               <c:idx val="2"/>
-              <c:layout/>
               <c:tx>
                 <c:rich>
                   <a:bodyPr/>
                   <a:lstStyle/>
                   <a:p>
                     <a:r>
-                      <a:rPr lang="en-US" dirty="0" smtClean="0"/>
-                      <a:t>20</a:t>
-                    </a:r>
-                    <a:r>
                       <a:rPr lang="en-US" dirty="0"/>
-                      <a:t>%</a:t>
+                      <a:t>20%</a:t>
                     </a:r>
                   </a:p>
                 </c:rich>
@@ -253,22 +275,23 @@
               <c:showSerName val="0"/>
               <c:showPercent val="1"/>
               <c:showBubbleSize val="0"/>
+              <c:extLst>
+                <c:ext xmlns:c15="http://schemas.microsoft.com/office/drawing/2012/chart" uri="{CE6537A1-D6FC-4f65-9D91-7224C49458BB}"/>
+                <c:ext xmlns:c16="http://schemas.microsoft.com/office/drawing/2014/chart" uri="{C3380CC4-5D6E-409C-BE32-E72D297353CC}">
+                  <c16:uniqueId val="{00000002-EB02-4199-875A-2F5AA991C3F8}"/>
+                </c:ext>
+              </c:extLst>
             </c:dLbl>
             <c:dLbl>
               <c:idx val="3"/>
-              <c:layout/>
               <c:tx>
                 <c:rich>
                   <a:bodyPr/>
                   <a:lstStyle/>
                   <a:p>
                     <a:r>
-                      <a:rPr lang="en-US" dirty="0" smtClean="0"/>
-                      <a:t>45</a:t>
-                    </a:r>
-                    <a:r>
                       <a:rPr lang="en-US" dirty="0"/>
-                      <a:t>%</a:t>
+                      <a:t>45%</a:t>
                     </a:r>
                   </a:p>
                 </c:rich>
@@ -279,7 +302,20 @@
               <c:showSerName val="0"/>
               <c:showPercent val="1"/>
               <c:showBubbleSize val="0"/>
+              <c:extLst>
+                <c:ext xmlns:c15="http://schemas.microsoft.com/office/drawing/2012/chart" uri="{CE6537A1-D6FC-4f65-9D91-7224C49458BB}"/>
+                <c:ext xmlns:c16="http://schemas.microsoft.com/office/drawing/2014/chart" uri="{C3380CC4-5D6E-409C-BE32-E72D297353CC}">
+                  <c16:uniqueId val="{00000003-EB02-4199-875A-2F5AA991C3F8}"/>
+                </c:ext>
+              </c:extLst>
             </c:dLbl>
+            <c:spPr>
+              <a:noFill/>
+              <a:ln>
+                <a:noFill/>
+              </a:ln>
+              <a:effectLst/>
+            </c:spPr>
             <c:showLegendKey val="0"/>
             <c:showVal val="0"/>
             <c:showCatName val="0"/>
@@ -287,6 +323,9 @@
             <c:showPercent val="1"/>
             <c:showBubbleSize val="0"/>
             <c:showLeaderLines val="1"/>
+            <c:extLst>
+              <c:ext xmlns:c15="http://schemas.microsoft.com/office/drawing/2012/chart" uri="{CE6537A1-D6FC-4f65-9D91-7224C49458BB}"/>
+            </c:extLst>
           </c:dLbls>
           <c:cat>
             <c:strRef>
@@ -329,6 +368,11 @@
               </c:numCache>
             </c:numRef>
           </c:val>
+          <c:extLst>
+            <c:ext xmlns:c16="http://schemas.microsoft.com/office/drawing/2014/chart" uri="{C3380CC4-5D6E-409C-BE32-E72D297353CC}">
+              <c16:uniqueId val="{00000004-EB02-4199-875A-2F5AA991C3F8}"/>
+            </c:ext>
+          </c:extLst>
         </c:ser>
         <c:dLbls>
           <c:showLegendKey val="0"/>
@@ -343,7 +387,6 @@
     </c:plotArea>
     <c:legend>
       <c:legendPos val="r"/>
-      <c:layout/>
       <c:overlay val="0"/>
     </c:legend>
     <c:plotVisOnly val="1"/>
@@ -357,7 +400,7 @@
       <a:pPr>
         <a:defRPr sz="1800"/>
       </a:pPr>
-      <a:endParaRPr lang="de-DE"/>
+      <a:endParaRPr lang="en-US"/>
     </a:p>
   </c:txPr>
   <c:externalData r:id="rId1">
@@ -537,7 +580,7 @@
           <a:p>
             <a:fld id="{F1BD226D-6836-49A0-A80F-C5C41B3E138F}" type="slidenum">
               <a:rPr lang="en-US" smtClean="0"/>
-              <a:t>‹Nr.›</a:t>
+              <a:t>‹#›</a:t>
             </a:fld>
             <a:endParaRPr lang="en-US"/>
           </a:p>
@@ -705,7 +748,7 @@
           <a:p>
             <a:fld id="{F1BD226D-6836-49A0-A80F-C5C41B3E138F}" type="slidenum">
               <a:rPr lang="en-US" smtClean="0"/>
-              <a:t>‹Nr.›</a:t>
+              <a:t>‹#›</a:t>
             </a:fld>
             <a:endParaRPr lang="en-US"/>
           </a:p>
@@ -883,7 +926,7 @@
           <a:p>
             <a:fld id="{F1BD226D-6836-49A0-A80F-C5C41B3E138F}" type="slidenum">
               <a:rPr lang="en-US" smtClean="0"/>
-              <a:t>‹Nr.›</a:t>
+              <a:t>‹#›</a:t>
             </a:fld>
             <a:endParaRPr lang="en-US"/>
           </a:p>
@@ -1051,7 +1094,7 @@
           <a:p>
             <a:fld id="{F1BD226D-6836-49A0-A80F-C5C41B3E138F}" type="slidenum">
               <a:rPr lang="en-US" smtClean="0"/>
-              <a:t>‹Nr.›</a:t>
+              <a:t>‹#›</a:t>
             </a:fld>
             <a:endParaRPr lang="en-US"/>
           </a:p>
@@ -1296,7 +1339,7 @@
           <a:p>
             <a:fld id="{F1BD226D-6836-49A0-A80F-C5C41B3E138F}" type="slidenum">
               <a:rPr lang="en-US" smtClean="0"/>
-              <a:t>‹Nr.›</a:t>
+              <a:t>‹#›</a:t>
             </a:fld>
             <a:endParaRPr lang="en-US"/>
           </a:p>
@@ -1525,7 +1568,7 @@
           <a:p>
             <a:fld id="{F1BD226D-6836-49A0-A80F-C5C41B3E138F}" type="slidenum">
               <a:rPr lang="en-US" smtClean="0"/>
-              <a:t>‹Nr.›</a:t>
+              <a:t>‹#›</a:t>
             </a:fld>
             <a:endParaRPr lang="en-US"/>
           </a:p>
@@ -1889,7 +1932,7 @@
           <a:p>
             <a:fld id="{F1BD226D-6836-49A0-A80F-C5C41B3E138F}" type="slidenum">
               <a:rPr lang="en-US" smtClean="0"/>
-              <a:t>‹Nr.›</a:t>
+              <a:t>‹#›</a:t>
             </a:fld>
             <a:endParaRPr lang="en-US"/>
           </a:p>
@@ -2006,7 +2049,7 @@
           <a:p>
             <a:fld id="{F1BD226D-6836-49A0-A80F-C5C41B3E138F}" type="slidenum">
               <a:rPr lang="en-US" smtClean="0"/>
-              <a:t>‹Nr.›</a:t>
+              <a:t>‹#›</a:t>
             </a:fld>
             <a:endParaRPr lang="en-US"/>
           </a:p>
@@ -2101,7 +2144,7 @@
           <a:p>
             <a:fld id="{F1BD226D-6836-49A0-A80F-C5C41B3E138F}" type="slidenum">
               <a:rPr lang="en-US" smtClean="0"/>
-              <a:t>‹Nr.›</a:t>
+              <a:t>‹#›</a:t>
             </a:fld>
             <a:endParaRPr lang="en-US"/>
           </a:p>
@@ -2376,7 +2419,7 @@
           <a:p>
             <a:fld id="{F1BD226D-6836-49A0-A80F-C5C41B3E138F}" type="slidenum">
               <a:rPr lang="en-US" smtClean="0"/>
-              <a:t>‹Nr.›</a:t>
+              <a:t>‹#›</a:t>
             </a:fld>
             <a:endParaRPr lang="en-US"/>
           </a:p>
@@ -2628,7 +2671,7 @@
           <a:p>
             <a:fld id="{F1BD226D-6836-49A0-A80F-C5C41B3E138F}" type="slidenum">
               <a:rPr lang="en-US" smtClean="0"/>
-              <a:t>‹Nr.›</a:t>
+              <a:t>‹#›</a:t>
             </a:fld>
             <a:endParaRPr lang="en-US"/>
           </a:p>
@@ -2875,7 +2918,7 @@
           <a:p>
             <a:fld id="{F1BD226D-6836-49A0-A80F-C5C41B3E138F}" type="slidenum">
               <a:rPr lang="en-US" smtClean="0"/>
-              <a:t>‹Nr.›</a:t>
+              <a:t>‹#›</a:t>
             </a:fld>
             <a:endParaRPr lang="en-US"/>
           </a:p>
@@ -3470,26 +3513,26 @@
           <a:p>
             <a:pPr algn="l"/>
             <a:r>
-              <a:rPr lang="en-US" dirty="0" smtClean="0"/>
+              <a:rPr lang="en-US" dirty="0"/>
               <a:t>CEO: Martin </a:t>
             </a:r>
             <a:r>
-              <a:rPr lang="en-US" dirty="0" err="1" smtClean="0"/>
+              <a:rPr lang="en-US" dirty="0" err="1"/>
               <a:t>Geßenich</a:t>
             </a:r>
-            <a:endParaRPr lang="en-US" dirty="0" smtClean="0"/>
+            <a:endParaRPr lang="en-US" dirty="0"/>
           </a:p>
           <a:p>
             <a:pPr algn="l"/>
             <a:r>
-              <a:rPr lang="en-US" dirty="0" smtClean="0"/>
+              <a:rPr lang="en-US" dirty="0"/>
               <a:t>Sales Manager: Christoph </a:t>
             </a:r>
             <a:r>
-              <a:rPr lang="en-US" dirty="0" err="1" smtClean="0"/>
+              <a:rPr lang="en-US" dirty="0" err="1"/>
               <a:t>Gröger</a:t>
             </a:r>
-            <a:endParaRPr lang="en-US" dirty="0" smtClean="0"/>
+            <a:endParaRPr lang="en-US" dirty="0"/>
           </a:p>
           <a:p>
             <a:pPr lvl="1" algn="l"/>
@@ -3507,13 +3550,6 @@
   <p:clrMapOvr>
     <a:masterClrMapping/>
   </p:clrMapOvr>
-  <p:timing>
-    <p:tnLst>
-      <p:par>
-        <p:cTn id="1" dur="indefinite" restart="never" nodeType="tmRoot"/>
-      </p:par>
-    </p:tnLst>
-  </p:timing>
 </p:sld>
 </file>
 
@@ -3550,7 +3586,7 @@
           <a:lstStyle/>
           <a:p>
             <a:r>
-              <a:rPr lang="en-US" dirty="0" smtClean="0">
+              <a:rPr lang="en-US" dirty="0">
                 <a:solidFill>
                   <a:schemeClr val="accent1">
                     <a:lumMod val="75000"/>
@@ -3560,14 +3596,6 @@
               </a:rPr>
               <a:t>Cost Plan</a:t>
             </a:r>
-            <a:endParaRPr lang="en-US" dirty="0">
-              <a:solidFill>
-                <a:schemeClr val="accent1">
-                  <a:lumMod val="75000"/>
-                </a:schemeClr>
-              </a:solidFill>
-              <a:latin typeface="Arial Narrow" panose="020B0606020202030204" pitchFamily="34" charset="0"/>
-            </a:endParaRPr>
           </a:p>
         </p:txBody>
       </p:sp>
@@ -3590,6 +3618,33 @@
         <p:txBody>
           <a:bodyPr/>
           <a:lstStyle/>
+          <a:p>
+            <a:r>
+              <a:rPr lang="en-US" dirty="0"/>
+              <a:t>Man hour rate 120 € </a:t>
+            </a:r>
+          </a:p>
+          <a:p>
+            <a:r>
+              <a:rPr lang="en-US" dirty="0"/>
+              <a:t>Approximation of 60 man hours</a:t>
+            </a:r>
+          </a:p>
+          <a:p>
+            <a:r>
+              <a:rPr lang="en-US" dirty="0"/>
+              <a:t>Mark-up 25 %</a:t>
+            </a:r>
+          </a:p>
+          <a:p>
+            <a:pPr marL="0" indent="0">
+              <a:buNone/>
+            </a:pPr>
+            <a:r>
+              <a:rPr lang="en-US" dirty="0"/>
+              <a:t>         Overall fix cost of 9000 €</a:t>
+            </a:r>
+          </a:p>
           <a:p>
             <a:endParaRPr lang="en-US" dirty="0"/>
           </a:p>
@@ -3939,6 +3994,58 @@
           </p:txBody>
         </p:sp>
       </p:grpSp>
+      <p:sp>
+        <p:nvSpPr>
+          <p:cNvPr id="4" name="Arrow: Right 3"/>
+          <p:cNvSpPr/>
+          <p:nvPr/>
+        </p:nvSpPr>
+        <p:spPr>
+          <a:xfrm>
+            <a:off x="1013924" y="3472069"/>
+            <a:ext cx="463826" cy="198783"/>
+          </a:xfrm>
+          <a:prstGeom prst="rightArrow">
+            <a:avLst/>
+          </a:prstGeom>
+          <a:solidFill>
+            <a:schemeClr val="accent1">
+              <a:lumMod val="75000"/>
+            </a:schemeClr>
+          </a:solidFill>
+          <a:ln>
+            <a:solidFill>
+              <a:schemeClr val="accent1">
+                <a:lumMod val="75000"/>
+              </a:schemeClr>
+            </a:solidFill>
+          </a:ln>
+        </p:spPr>
+        <p:style>
+          <a:lnRef idx="2">
+            <a:schemeClr val="accent1">
+              <a:shade val="50000"/>
+            </a:schemeClr>
+          </a:lnRef>
+          <a:fillRef idx="1">
+            <a:schemeClr val="accent1"/>
+          </a:fillRef>
+          <a:effectRef idx="0">
+            <a:schemeClr val="accent1"/>
+          </a:effectRef>
+          <a:fontRef idx="minor">
+            <a:schemeClr val="lt1"/>
+          </a:fontRef>
+        </p:style>
+        <p:txBody>
+          <a:bodyPr rtlCol="0" anchor="ctr"/>
+          <a:lstStyle/>
+          <a:p>
+            <a:pPr algn="ctr"/>
+            <a:endParaRPr lang="en-US"/>
+          </a:p>
+        </p:txBody>
+      </p:sp>
     </p:spTree>
     <p:extLst>
       <p:ext uri="{BB962C8B-B14F-4D97-AF65-F5344CB8AC3E}">
@@ -4050,21 +4157,16 @@
             </a:pPr>
             <a:r>
               <a:rPr lang="en-US" dirty="0"/>
-              <a:t>+49241 </a:t>
-            </a:r>
-            <a:r>
-              <a:rPr lang="en-US" dirty="0" smtClean="0"/>
-              <a:t>79123789</a:t>
-            </a:r>
-            <a:endParaRPr lang="en-US" dirty="0" smtClean="0"/>
-          </a:p>
-          <a:p>
-            <a:r>
-              <a:rPr lang="en-US" dirty="0" smtClean="0"/>
+              <a:t>+49241 79123789</a:t>
+            </a:r>
+          </a:p>
+          <a:p>
+            <a:r>
+              <a:rPr lang="en-US" dirty="0"/>
               <a:t>CTO: Florian </a:t>
             </a:r>
             <a:r>
-              <a:rPr lang="en-US" dirty="0" err="1" smtClean="0"/>
+              <a:rPr lang="en-US" dirty="0" err="1"/>
               <a:t>Schaar</a:t>
             </a:r>
             <a:endParaRPr lang="en-US" dirty="0"/>
@@ -4074,7 +4176,7 @@
               <a:buNone/>
             </a:pPr>
             <a:r>
-              <a:rPr lang="en-US" dirty="0" smtClean="0">
+              <a:rPr lang="en-US" dirty="0">
                 <a:hlinkClick r:id="rId2"/>
               </a:rPr>
               <a:t>Florian.schaar@crap.com</a:t>
@@ -4087,13 +4189,8 @@
             </a:pPr>
             <a:r>
               <a:rPr lang="en-US" dirty="0"/>
-              <a:t>+49241 </a:t>
-            </a:r>
-            <a:r>
-              <a:rPr lang="en-US" dirty="0" smtClean="0"/>
-              <a:t>79123689</a:t>
-            </a:r>
-            <a:endParaRPr lang="en-US" dirty="0"/>
+              <a:t>+49241 79123689</a:t>
+            </a:r>
           </a:p>
           <a:p>
             <a:pPr lvl="1"/>
@@ -4632,14 +4729,14 @@
           </a:lstStyle>
           <a:p>
             <a:r>
-              <a:rPr lang="en-US" dirty="0" smtClean="0"/>
+              <a:rPr lang="en-US" dirty="0"/>
               <a:t>Sales Manager: Christoph </a:t>
             </a:r>
             <a:r>
-              <a:rPr lang="en-US" dirty="0" err="1" smtClean="0"/>
+              <a:rPr lang="en-US" dirty="0" err="1"/>
               <a:t>Gröger</a:t>
             </a:r>
-            <a:endParaRPr lang="en-US" dirty="0" smtClean="0"/>
+            <a:endParaRPr lang="en-US" dirty="0"/>
           </a:p>
           <a:p>
             <a:pPr marL="457200" lvl="1" indent="0">
@@ -4647,12 +4744,12 @@
               <a:buNone/>
             </a:pPr>
             <a:r>
-              <a:rPr lang="en-US" dirty="0" smtClean="0">
+              <a:rPr lang="en-US" dirty="0">
                 <a:hlinkClick r:id="rId4"/>
               </a:rPr>
               <a:t>Christoph.groeger@crap.com</a:t>
             </a:r>
-            <a:endParaRPr lang="en-US" dirty="0" smtClean="0"/>
+            <a:endParaRPr lang="en-US" dirty="0"/>
           </a:p>
           <a:p>
             <a:pPr marL="457200" lvl="1" indent="0">
@@ -4660,7 +4757,7 @@
               <a:buNone/>
             </a:pPr>
             <a:r>
-              <a:rPr lang="en-US" dirty="0" smtClean="0"/>
+              <a:rPr lang="en-US" dirty="0"/>
               <a:t>+49241 79128902</a:t>
             </a:r>
           </a:p>
@@ -4693,19 +4790,11 @@
           </a:p>
           <a:p>
             <a:r>
-              <a:rPr lang="en-US" dirty="0" smtClean="0"/>
-              <a:t>Dev. Manager</a:t>
-            </a:r>
-            <a:r>
               <a:rPr lang="en-US" dirty="0"/>
-              <a:t>: </a:t>
-            </a:r>
-            <a:r>
-              <a:rPr lang="en-US" dirty="0" smtClean="0"/>
-              <a:t>Felix </a:t>
-            </a:r>
-            <a:r>
-              <a:rPr lang="en-US" dirty="0" err="1" smtClean="0"/>
+              <a:t>Dev. Manager: Felix </a:t>
+            </a:r>
+            <a:r>
+              <a:rPr lang="en-US" dirty="0" err="1"/>
               <a:t>Batke</a:t>
             </a:r>
             <a:endParaRPr lang="en-US" dirty="0"/>
@@ -4715,7 +4804,7 @@
               <a:buNone/>
             </a:pPr>
             <a:r>
-              <a:rPr lang="en-US" dirty="0" smtClean="0">
+              <a:rPr lang="en-US" dirty="0">
                 <a:hlinkClick r:id="rId5"/>
               </a:rPr>
               <a:t>Felix.batke@crap.com</a:t>
@@ -4728,13 +4817,8 @@
             </a:pPr>
             <a:r>
               <a:rPr lang="en-US" dirty="0"/>
-              <a:t>+49241 </a:t>
-            </a:r>
-            <a:r>
-              <a:rPr lang="en-US" dirty="0" smtClean="0"/>
-              <a:t>79128905</a:t>
-            </a:r>
-            <a:endParaRPr lang="en-US" dirty="0"/>
+              <a:t>+49241 79128905</a:t>
+            </a:r>
           </a:p>
           <a:p>
             <a:pPr marL="457200" lvl="1" indent="0">
@@ -4825,35 +4909,25 @@
           <a:p>
             <a:r>
               <a:rPr lang="en-US" dirty="0"/>
-              <a:t>Founded </a:t>
-            </a:r>
-            <a:r>
-              <a:rPr lang="en-US" dirty="0" smtClean="0"/>
-              <a:t>1988</a:t>
-            </a:r>
-          </a:p>
-          <a:p>
-            <a:r>
-              <a:rPr lang="en-US" dirty="0" smtClean="0"/>
+              <a:t>Founded 1988</a:t>
+            </a:r>
+          </a:p>
+          <a:p>
+            <a:r>
+              <a:rPr lang="en-US" dirty="0"/>
               <a:t>Steadily growing</a:t>
             </a:r>
-            <a:endParaRPr lang="en-US" dirty="0"/>
-          </a:p>
-          <a:p>
-            <a:r>
-              <a:rPr lang="en-US" dirty="0" smtClean="0"/>
+          </a:p>
+          <a:p>
+            <a:r>
+              <a:rPr lang="en-US" dirty="0"/>
               <a:t>230 employees</a:t>
             </a:r>
-            <a:endParaRPr lang="en-US" dirty="0"/>
-          </a:p>
-          <a:p>
-            <a:r>
-              <a:rPr lang="en-US" dirty="0" smtClean="0"/>
-              <a:t>Site</a:t>
-            </a:r>
+          </a:p>
+          <a:p>
             <a:r>
               <a:rPr lang="en-US" dirty="0"/>
-              <a:t>: 52064 Aachen, </a:t>
+              <a:t>Site: 52064 Aachen, </a:t>
             </a:r>
             <a:r>
               <a:rPr lang="en-US" dirty="0" err="1"/>
@@ -5292,13 +5366,6 @@
   <p:clrMapOvr>
     <a:masterClrMapping/>
   </p:clrMapOvr>
-  <p:timing>
-    <p:tnLst>
-      <p:par>
-        <p:cTn id="1" dur="indefinite" restart="never" nodeType="tmRoot"/>
-      </p:par>
-    </p:tnLst>
-  </p:timing>
 </p:sld>
 </file>
 
@@ -5343,27 +5410,8 @@
                 </a:solidFill>
                 <a:latin typeface="Arial Narrow" panose="020B0606020202030204" pitchFamily="34" charset="0"/>
               </a:rPr>
-              <a:t>Company </a:t>
-            </a:r>
-            <a:r>
-              <a:rPr lang="en-US" dirty="0" smtClean="0">
-                <a:solidFill>
-                  <a:schemeClr val="accent1">
-                    <a:lumMod val="75000"/>
-                  </a:schemeClr>
-                </a:solidFill>
-                <a:latin typeface="Arial Narrow" panose="020B0606020202030204" pitchFamily="34" charset="0"/>
-              </a:rPr>
-              <a:t>distribution</a:t>
-            </a:r>
-            <a:endParaRPr lang="en-US" dirty="0">
-              <a:solidFill>
-                <a:schemeClr val="accent1">
-                  <a:lumMod val="75000"/>
-                </a:schemeClr>
-              </a:solidFill>
-              <a:latin typeface="Arial Narrow" panose="020B0606020202030204" pitchFamily="34" charset="0"/>
-            </a:endParaRPr>
+              <a:t>Company distribution</a:t>
+            </a:r>
           </a:p>
         </p:txBody>
       </p:sp>
@@ -5782,13 +5830,6 @@
   <p:clrMapOvr>
     <a:masterClrMapping/>
   </p:clrMapOvr>
-  <p:timing>
-    <p:tnLst>
-      <p:par>
-        <p:cTn id="1" dur="indefinite" restart="never" nodeType="tmRoot"/>
-      </p:par>
-    </p:tnLst>
-  </p:timing>
 </p:sld>
 </file>
 
@@ -5833,27 +5874,8 @@
                 </a:solidFill>
                 <a:latin typeface="Arial Narrow" panose="020B0606020202030204" pitchFamily="34" charset="0"/>
               </a:rPr>
-              <a:t>Company </a:t>
-            </a:r>
-            <a:r>
-              <a:rPr lang="en-US" dirty="0" smtClean="0">
-                <a:solidFill>
-                  <a:schemeClr val="accent1">
-                    <a:lumMod val="75000"/>
-                  </a:schemeClr>
-                </a:solidFill>
-                <a:latin typeface="Arial Narrow" panose="020B0606020202030204" pitchFamily="34" charset="0"/>
-              </a:rPr>
-              <a:t>philosophy</a:t>
-            </a:r>
-            <a:endParaRPr lang="en-US" dirty="0">
-              <a:solidFill>
-                <a:schemeClr val="accent1">
-                  <a:lumMod val="75000"/>
-                </a:schemeClr>
-              </a:solidFill>
-              <a:latin typeface="Arial Narrow" panose="020B0606020202030204" pitchFamily="34" charset="0"/>
-            </a:endParaRPr>
+              <a:t>Company philosophy</a:t>
+            </a:r>
           </a:p>
         </p:txBody>
       </p:sp>
@@ -5882,7 +5904,7 @@
               <a:buChar char="ü"/>
             </a:pPr>
             <a:r>
-              <a:rPr lang="en-US" dirty="0" smtClean="0"/>
+              <a:rPr lang="en-US" dirty="0"/>
               <a:t>Direct and lasting customer contact</a:t>
             </a:r>
           </a:p>
@@ -5892,7 +5914,7 @@
               <a:buChar char="ü"/>
             </a:pPr>
             <a:r>
-              <a:rPr lang="en-US" dirty="0" smtClean="0"/>
+              <a:rPr lang="en-US" dirty="0"/>
               <a:t>Extensibility</a:t>
             </a:r>
           </a:p>
@@ -5902,10 +5924,9 @@
               <a:buChar char="ü"/>
             </a:pPr>
             <a:r>
-              <a:rPr lang="en-US" dirty="0" smtClean="0"/>
+              <a:rPr lang="en-US" dirty="0"/>
               <a:t>Reliable quality management</a:t>
             </a:r>
-            <a:endParaRPr lang="en-US" dirty="0"/>
           </a:p>
           <a:p>
             <a:pPr>
@@ -5913,10 +5934,9 @@
               <a:buChar char="ü"/>
             </a:pPr>
             <a:r>
-              <a:rPr lang="en-US" dirty="0" smtClean="0"/>
+              <a:rPr lang="en-US" dirty="0"/>
               <a:t>Easy understandable documentation</a:t>
             </a:r>
-            <a:endParaRPr lang="en-US" dirty="0" smtClean="0"/>
           </a:p>
           <a:p>
             <a:pPr>
@@ -5924,17 +5944,16 @@
               <a:buChar char="ü"/>
             </a:pPr>
             <a:r>
-              <a:rPr lang="en-US" dirty="0" smtClean="0"/>
+              <a:rPr lang="en-US" dirty="0"/>
               <a:t>Training and support</a:t>
             </a:r>
-            <a:endParaRPr lang="en-US" dirty="0"/>
           </a:p>
           <a:p>
             <a:pPr>
               <a:buFont typeface="Wingdings" panose="05000000000000000000" pitchFamily="2" charset="2"/>
               <a:buChar char="ü"/>
             </a:pPr>
-            <a:endParaRPr lang="en-US" dirty="0" smtClean="0"/>
+            <a:endParaRPr lang="en-US" dirty="0"/>
           </a:p>
         </p:txBody>
       </p:sp>
@@ -6331,13 +6350,6 @@
   <p:clrMapOvr>
     <a:masterClrMapping/>
   </p:clrMapOvr>
-  <p:timing>
-    <p:tnLst>
-      <p:par>
-        <p:cTn id="1" dur="indefinite" restart="never" nodeType="tmRoot"/>
-      </p:par>
-    </p:tnLst>
-  </p:timing>
 </p:sld>
 </file>
 
@@ -6456,13 +6468,8 @@
             </a:pPr>
             <a:r>
               <a:rPr lang="en-US" dirty="0"/>
-              <a:t>  response time </a:t>
-            </a:r>
-            <a:r>
-              <a:rPr lang="en-US" dirty="0" smtClean="0"/>
-              <a:t>during all that years.”</a:t>
-            </a:r>
-            <a:endParaRPr lang="en-US" dirty="0"/>
+              <a:t>  response time during all that years.”</a:t>
+            </a:r>
           </a:p>
           <a:p>
             <a:pPr marL="0" indent="0">
@@ -7001,27 +7008,8 @@
                 </a:solidFill>
                 <a:latin typeface="Arial Narrow" panose="020B0606020202030204" pitchFamily="34" charset="0"/>
               </a:rPr>
-              <a:t>Previous Projects </a:t>
-            </a:r>
-            <a:r>
-              <a:rPr lang="en-US" dirty="0" smtClean="0">
-                <a:solidFill>
-                  <a:schemeClr val="accent1">
-                    <a:lumMod val="75000"/>
-                  </a:schemeClr>
-                </a:solidFill>
-                <a:latin typeface="Arial Narrow" panose="020B0606020202030204" pitchFamily="34" charset="0"/>
-              </a:rPr>
-              <a:t>with</a:t>
-            </a:r>
-            <a:endParaRPr lang="en-US" dirty="0">
-              <a:solidFill>
-                <a:schemeClr val="accent1">
-                  <a:lumMod val="75000"/>
-                </a:schemeClr>
-              </a:solidFill>
-              <a:latin typeface="Arial Narrow" panose="020B0606020202030204" pitchFamily="34" charset="0"/>
-            </a:endParaRPr>
+              <a:t>Previous Projects with</a:t>
+            </a:r>
           </a:p>
         </p:txBody>
       </p:sp>
@@ -7046,68 +7034,42 @@
           <a:lstStyle/>
           <a:p>
             <a:r>
-              <a:rPr lang="en-US" dirty="0" smtClean="0"/>
+              <a:rPr lang="en-US" dirty="0"/>
               <a:t>Project started in 2002</a:t>
             </a:r>
           </a:p>
           <a:p>
             <a:pPr lvl="1"/>
             <a:r>
-              <a:rPr lang="en-US" dirty="0" smtClean="0"/>
-              <a:t>Automated </a:t>
-            </a:r>
-            <a:r>
               <a:rPr lang="en-US" dirty="0"/>
-              <a:t>collection of </a:t>
-            </a:r>
-            <a:r>
-              <a:rPr lang="en-US" dirty="0" smtClean="0"/>
-              <a:t>business </a:t>
-            </a:r>
+              <a:t>Automated collection of business data </a:t>
+            </a:r>
+          </a:p>
+          <a:p>
+            <a:pPr lvl="1"/>
             <a:r>
               <a:rPr lang="en-US" dirty="0"/>
-              <a:t>data </a:t>
+              <a:t>Report service for invoices</a:t>
+            </a:r>
+          </a:p>
+          <a:p>
+            <a:r>
+              <a:rPr lang="en-US" dirty="0"/>
+              <a:t>Continuous maintenance since installation</a:t>
             </a:r>
           </a:p>
           <a:p>
             <a:pPr lvl="1"/>
             <a:r>
               <a:rPr lang="en-US" dirty="0"/>
-              <a:t>Report service for </a:t>
-            </a:r>
-            <a:r>
-              <a:rPr lang="en-US" dirty="0" smtClean="0"/>
-              <a:t>invoices</a:t>
-            </a:r>
-          </a:p>
-          <a:p>
-            <a:r>
-              <a:rPr lang="en-US" dirty="0" smtClean="0"/>
-              <a:t>Continuous maintenance since installation</a:t>
-            </a:r>
-          </a:p>
-          <a:p>
-            <a:pPr lvl="1"/>
-            <a:r>
-              <a:rPr lang="en-US" dirty="0" smtClean="0"/>
               <a:t>Including upgrades and trainings</a:t>
             </a:r>
-            <a:endParaRPr lang="en-US" dirty="0" smtClean="0"/>
-          </a:p>
-          <a:p>
-            <a:r>
-              <a:rPr lang="en-US" dirty="0" smtClean="0"/>
-              <a:t>Close </a:t>
-            </a:r>
+          </a:p>
+          <a:p>
             <a:r>
               <a:rPr lang="en-US" dirty="0"/>
-              <a:t>collaboration with our customer </a:t>
-            </a:r>
-            <a:r>
-              <a:rPr lang="en-US" dirty="0" smtClean="0"/>
-              <a:t>Telstra during all stages</a:t>
-            </a:r>
-            <a:endParaRPr lang="en-US" dirty="0"/>
+              <a:t>Close collaboration with our customer Telstra during all stages</a:t>
+            </a:r>
           </a:p>
         </p:txBody>
       </p:sp>
@@ -7531,7 +7493,7 @@
           <a:lstStyle/>
           <a:p>
             <a:r>
-              <a:rPr lang="en-US" dirty="0" smtClean="0">
+              <a:rPr lang="en-US" dirty="0">
                 <a:solidFill>
                   <a:schemeClr val="accent1">
                     <a:lumMod val="75000"/>
@@ -7541,14 +7503,6 @@
               </a:rPr>
               <a:t>Technical Proposal</a:t>
             </a:r>
-            <a:endParaRPr lang="en-US" dirty="0">
-              <a:solidFill>
-                <a:schemeClr val="accent1">
-                  <a:lumMod val="75000"/>
-                </a:schemeClr>
-              </a:solidFill>
-              <a:latin typeface="Arial Narrow" panose="020B0606020202030204" pitchFamily="34" charset="0"/>
-            </a:endParaRPr>
           </a:p>
         </p:txBody>
       </p:sp>
@@ -7571,6 +7525,33 @@
         <p:txBody>
           <a:bodyPr/>
           <a:lstStyle/>
+          <a:p>
+            <a:pPr marL="0" indent="0">
+              <a:buNone/>
+            </a:pPr>
+            <a:r>
+              <a:rPr lang="en-US" dirty="0"/>
+              <a:t>Delivery: one executable jar file</a:t>
+            </a:r>
+          </a:p>
+          <a:p>
+            <a:r>
+              <a:rPr lang="en-US" dirty="0"/>
+              <a:t>Persistent storage of data</a:t>
+            </a:r>
+          </a:p>
+          <a:p>
+            <a:r>
+              <a:rPr lang="en-US" dirty="0"/>
+              <a:t>Slim command Line interface</a:t>
+            </a:r>
+          </a:p>
+          <a:p>
+            <a:r>
+              <a:rPr lang="en-US" dirty="0"/>
+              <a:t>Each user gets a unique account to ensure verification</a:t>
+            </a:r>
+          </a:p>
           <a:p>
             <a:endParaRPr lang="en-US" dirty="0"/>
           </a:p>
@@ -7966,7 +7947,7 @@
           <a:lstStyle/>
           <a:p>
             <a:r>
-              <a:rPr lang="en-US" dirty="0" smtClean="0">
+              <a:rPr lang="en-US" dirty="0">
                 <a:solidFill>
                   <a:schemeClr val="accent1">
                     <a:lumMod val="75000"/>
@@ -7976,14 +7957,6 @@
               </a:rPr>
               <a:t>Time Plan</a:t>
             </a:r>
-            <a:endParaRPr lang="en-US" dirty="0">
-              <a:solidFill>
-                <a:schemeClr val="accent1">
-                  <a:lumMod val="75000"/>
-                </a:schemeClr>
-              </a:solidFill>
-              <a:latin typeface="Arial Narrow" panose="020B0606020202030204" pitchFamily="34" charset="0"/>
-            </a:endParaRPr>
           </a:p>
         </p:txBody>
       </p:sp>
@@ -8006,6 +7979,18 @@
         <p:txBody>
           <a:bodyPr/>
           <a:lstStyle/>
+          <a:p>
+            <a:r>
+              <a:rPr lang="en-US" dirty="0"/>
+              <a:t>3 x 4 hours </a:t>
+            </a:r>
+          </a:p>
+          <a:p>
+            <a:r>
+              <a:rPr lang="en-US" dirty="0"/>
+              <a:t>Wednesday 03/08 to Friday 03/10</a:t>
+            </a:r>
+          </a:p>
           <a:p>
             <a:endParaRPr lang="en-US" dirty="0"/>
           </a:p>
@@ -8401,7 +8386,7 @@
           <a:lstStyle/>
           <a:p>
             <a:r>
-              <a:rPr lang="en-US" dirty="0" smtClean="0">
+              <a:rPr lang="en-US" dirty="0">
                 <a:solidFill>
                   <a:schemeClr val="accent1">
                     <a:lumMod val="75000"/>
@@ -8411,38 +8396,6 @@
               </a:rPr>
               <a:t>Communication Plan</a:t>
             </a:r>
-            <a:endParaRPr lang="en-US" dirty="0">
-              <a:solidFill>
-                <a:schemeClr val="accent1">
-                  <a:lumMod val="75000"/>
-                </a:schemeClr>
-              </a:solidFill>
-              <a:latin typeface="Arial Narrow" panose="020B0606020202030204" pitchFamily="34" charset="0"/>
-            </a:endParaRPr>
-          </a:p>
-        </p:txBody>
-      </p:sp>
-      <p:sp>
-        <p:nvSpPr>
-          <p:cNvPr id="3" name="Content Placeholder 2"/>
-          <p:cNvSpPr>
-            <a:spLocks noGrp="1"/>
-          </p:cNvSpPr>
-          <p:nvPr>
-            <p:ph idx="1"/>
-          </p:nvPr>
-        </p:nvSpPr>
-        <p:spPr>
-          <a:xfrm>
-            <a:off x="838199" y="1825625"/>
-            <a:ext cx="6559804" cy="4351338"/>
-          </a:xfrm>
-        </p:spPr>
-        <p:txBody>
-          <a:bodyPr/>
-          <a:lstStyle/>
-          <a:p>
-            <a:endParaRPr lang="en-US" dirty="0"/>
           </a:p>
         </p:txBody>
       </p:sp>
@@ -8790,6 +8743,187 @@
           </p:txBody>
         </p:sp>
       </p:grpSp>
+      <p:pic>
+        <p:nvPicPr>
+          <p:cNvPr id="14" name="table"/>
+          <p:cNvPicPr>
+            <a:picLocks noChangeAspect="1"/>
+          </p:cNvPicPr>
+          <p:nvPr/>
+        </p:nvPicPr>
+        <p:blipFill>
+          <a:blip r:embed="rId3"/>
+          <a:stretch>
+            <a:fillRect/>
+          </a:stretch>
+        </p:blipFill>
+        <p:spPr>
+          <a:xfrm>
+            <a:off x="1977690" y="1729833"/>
+            <a:ext cx="8236619" cy="4556113"/>
+          </a:xfrm>
+          <a:prstGeom prst="rect">
+            <a:avLst/>
+          </a:prstGeom>
+        </p:spPr>
+      </p:pic>
+      <p:sp>
+        <p:nvSpPr>
+          <p:cNvPr id="15" name="Rectangle 14"/>
+          <p:cNvSpPr>
+            <a:spLocks noChangeArrowheads="1"/>
+          </p:cNvSpPr>
+          <p:nvPr/>
+        </p:nvSpPr>
+        <p:spPr bwMode="auto">
+          <a:xfrm>
+            <a:off x="-1314538" y="1689428"/>
+            <a:ext cx="9859682" cy="401876"/>
+          </a:xfrm>
+          <a:prstGeom prst="rect">
+            <a:avLst/>
+          </a:prstGeom>
+          <a:noFill/>
+          <a:ln>
+            <a:noFill/>
+          </a:ln>
+          <a:effectLst/>
+          <a:extLst>
+            <a:ext uri="{909E8E84-426E-40DD-AFC4-6F175D3DCCD1}">
+              <a14:hiddenFill xmlns:a14="http://schemas.microsoft.com/office/drawing/2010/main">
+                <a:solidFill>
+                  <a:schemeClr val="accent1"/>
+                </a:solidFill>
+              </a14:hiddenFill>
+            </a:ext>
+            <a:ext uri="{91240B29-F687-4F45-9708-019B960494DF}">
+              <a14:hiddenLine xmlns:a14="http://schemas.microsoft.com/office/drawing/2010/main" w="9525">
+                <a:solidFill>
+                  <a:schemeClr val="tx1"/>
+                </a:solidFill>
+                <a:miter lim="800000"/>
+                <a:headEnd/>
+                <a:tailEnd/>
+              </a14:hiddenLine>
+            </a:ext>
+            <a:ext uri="{AF507438-7753-43E0-B8FC-AC1667EBCBE1}">
+              <a14:hiddenEffects xmlns:a14="http://schemas.microsoft.com/office/drawing/2010/main">
+                <a:effectLst>
+                  <a:outerShdw dist="35921" dir="2700000" algn="ctr" rotWithShape="0">
+                    <a:schemeClr val="bg2"/>
+                  </a:outerShdw>
+                </a:effectLst>
+              </a14:hiddenEffects>
+            </a:ext>
+          </a:extLst>
+        </p:spPr>
+        <p:txBody>
+          <a:bodyPr vert="horz" wrap="square" lIns="91440" tIns="45720" rIns="91440" bIns="45720" numCol="1" anchor="ctr" anchorCtr="0" compatLnSpc="1">
+            <a:prstTxWarp prst="textNoShape">
+              <a:avLst/>
+            </a:prstTxWarp>
+            <a:spAutoFit/>
+          </a:bodyPr>
+          <a:lstStyle>
+            <a:defPPr>
+              <a:defRPr lang="de-DE"/>
+            </a:defPPr>
+            <a:lvl1pPr marL="0" algn="l" defTabSz="914400" rtl="0" eaLnBrk="1" latinLnBrk="0" hangingPunct="1">
+              <a:defRPr sz="1800" kern="1200">
+                <a:solidFill>
+                  <a:schemeClr val="tx1"/>
+                </a:solidFill>
+                <a:latin typeface="+mn-lt"/>
+                <a:ea typeface="+mn-ea"/>
+                <a:cs typeface="+mn-cs"/>
+              </a:defRPr>
+            </a:lvl1pPr>
+            <a:lvl2pPr marL="457200" algn="l" defTabSz="914400" rtl="0" eaLnBrk="1" latinLnBrk="0" hangingPunct="1">
+              <a:defRPr sz="1800" kern="1200">
+                <a:solidFill>
+                  <a:schemeClr val="tx1"/>
+                </a:solidFill>
+                <a:latin typeface="+mn-lt"/>
+                <a:ea typeface="+mn-ea"/>
+                <a:cs typeface="+mn-cs"/>
+              </a:defRPr>
+            </a:lvl2pPr>
+            <a:lvl3pPr marL="914400" algn="l" defTabSz="914400" rtl="0" eaLnBrk="1" latinLnBrk="0" hangingPunct="1">
+              <a:defRPr sz="1800" kern="1200">
+                <a:solidFill>
+                  <a:schemeClr val="tx1"/>
+                </a:solidFill>
+                <a:latin typeface="+mn-lt"/>
+                <a:ea typeface="+mn-ea"/>
+                <a:cs typeface="+mn-cs"/>
+              </a:defRPr>
+            </a:lvl3pPr>
+            <a:lvl4pPr marL="1371600" algn="l" defTabSz="914400" rtl="0" eaLnBrk="1" latinLnBrk="0" hangingPunct="1">
+              <a:defRPr sz="1800" kern="1200">
+                <a:solidFill>
+                  <a:schemeClr val="tx1"/>
+                </a:solidFill>
+                <a:latin typeface="+mn-lt"/>
+                <a:ea typeface="+mn-ea"/>
+                <a:cs typeface="+mn-cs"/>
+              </a:defRPr>
+            </a:lvl4pPr>
+            <a:lvl5pPr marL="1828800" algn="l" defTabSz="914400" rtl="0" eaLnBrk="1" latinLnBrk="0" hangingPunct="1">
+              <a:defRPr sz="1800" kern="1200">
+                <a:solidFill>
+                  <a:schemeClr val="tx1"/>
+                </a:solidFill>
+                <a:latin typeface="+mn-lt"/>
+                <a:ea typeface="+mn-ea"/>
+                <a:cs typeface="+mn-cs"/>
+              </a:defRPr>
+            </a:lvl5pPr>
+            <a:lvl6pPr marL="2286000" algn="l" defTabSz="914400" rtl="0" eaLnBrk="1" latinLnBrk="0" hangingPunct="1">
+              <a:defRPr sz="1800" kern="1200">
+                <a:solidFill>
+                  <a:schemeClr val="tx1"/>
+                </a:solidFill>
+                <a:latin typeface="+mn-lt"/>
+                <a:ea typeface="+mn-ea"/>
+                <a:cs typeface="+mn-cs"/>
+              </a:defRPr>
+            </a:lvl6pPr>
+            <a:lvl7pPr marL="2743200" algn="l" defTabSz="914400" rtl="0" eaLnBrk="1" latinLnBrk="0" hangingPunct="1">
+              <a:defRPr sz="1800" kern="1200">
+                <a:solidFill>
+                  <a:schemeClr val="tx1"/>
+                </a:solidFill>
+                <a:latin typeface="+mn-lt"/>
+                <a:ea typeface="+mn-ea"/>
+                <a:cs typeface="+mn-cs"/>
+              </a:defRPr>
+            </a:lvl7pPr>
+            <a:lvl8pPr marL="3200400" algn="l" defTabSz="914400" rtl="0" eaLnBrk="1" latinLnBrk="0" hangingPunct="1">
+              <a:defRPr sz="1800" kern="1200">
+                <a:solidFill>
+                  <a:schemeClr val="tx1"/>
+                </a:solidFill>
+                <a:latin typeface="+mn-lt"/>
+                <a:ea typeface="+mn-ea"/>
+                <a:cs typeface="+mn-cs"/>
+              </a:defRPr>
+            </a:lvl8pPr>
+            <a:lvl9pPr marL="3657600" algn="l" defTabSz="914400" rtl="0" eaLnBrk="1" latinLnBrk="0" hangingPunct="1">
+              <a:defRPr sz="1800" kern="1200">
+                <a:solidFill>
+                  <a:schemeClr val="tx1"/>
+                </a:solidFill>
+                <a:latin typeface="+mn-lt"/>
+                <a:ea typeface="+mn-ea"/>
+                <a:cs typeface="+mn-cs"/>
+              </a:defRPr>
+            </a:lvl9pPr>
+          </a:lstStyle>
+          <a:p>
+            <a:endParaRPr lang="de-DE"/>
+          </a:p>
+        </p:txBody>
+      </p:sp>
     </p:spTree>
     <p:extLst>
       <p:ext uri="{BB962C8B-B14F-4D97-AF65-F5344CB8AC3E}">
@@ -9092,7 +9226,7 @@
   <a:extraClrSchemeLst/>
   <a:extLst>
     <a:ext uri="{05A4C25C-085E-4340-85A3-A5531E510DB2}">
-      <thm15:themeFamily xmlns:thm15="http://schemas.microsoft.com/office/thememl/2012/main" xmlns="" name="Office Theme" id="{62F939B6-93AF-4DB8-9C6B-D6C7DFDC589F}" vid="{4A3C46E8-61CC-4603-A589-7422A47A8E4A}"/>
+      <thm15:themeFamily xmlns:thm15="http://schemas.microsoft.com/office/thememl/2012/main" name="Office Theme" id="{62F939B6-93AF-4DB8-9C6B-D6C7DFDC589F}" vid="{4A3C46E8-61CC-4603-A589-7422A47A8E4A}"/>
     </a:ext>
   </a:extLst>
 </a:theme>

</xml_diff>